<commit_message>
Update Week_5 Team Grid Code Development WEC 2025.pptx
</commit_message>
<xml_diff>
--- a/3_Presentations/week 5/Week_5 Team Grid Code Development WEC 2025.pptx
+++ b/3_Presentations/week 5/Week_5 Team Grid Code Development WEC 2025.pptx
@@ -6,20 +6,21 @@
     <p:sldMasterId id="2147483672" r:id="rId2"/>
   </p:sldMasterIdLst>
   <p:notesMasterIdLst>
-    <p:notesMasterId r:id="rId11"/>
+    <p:notesMasterId r:id="rId12"/>
   </p:notesMasterIdLst>
   <p:handoutMasterIdLst>
-    <p:handoutMasterId r:id="rId12"/>
+    <p:handoutMasterId r:id="rId13"/>
   </p:handoutMasterIdLst>
   <p:sldIdLst>
     <p:sldId id="271" r:id="rId3"/>
     <p:sldId id="263" r:id="rId4"/>
     <p:sldId id="259" r:id="rId5"/>
-    <p:sldId id="278" r:id="rId6"/>
-    <p:sldId id="279" r:id="rId7"/>
-    <p:sldId id="276" r:id="rId8"/>
-    <p:sldId id="280" r:id="rId9"/>
-    <p:sldId id="267" r:id="rId10"/>
+    <p:sldId id="281" r:id="rId6"/>
+    <p:sldId id="278" r:id="rId7"/>
+    <p:sldId id="279" r:id="rId8"/>
+    <p:sldId id="276" r:id="rId9"/>
+    <p:sldId id="280" r:id="rId10"/>
+    <p:sldId id="267" r:id="rId11"/>
   </p:sldIdLst>
   <p:sldSz cx="12192000" cy="6858000"/>
   <p:notesSz cx="6858000" cy="9144000"/>
@@ -130,6 +131,7 @@
         <p14:section name="List of contents" id="{65043596-36B7-4360-BB5C-7A99EFAEC5C9}">
           <p14:sldIdLst>
             <p14:sldId id="259"/>
+            <p14:sldId id="281"/>
           </p14:sldIdLst>
         </p14:section>
         <p14:section name="Title, main slides" id="{B26F6679-C236-4D3D-BC2F-CAE5ED400718}">
@@ -24485,42 +24487,49 @@
           <a:p>
             <a:pPr lvl="0"/>
             <a:r>
-              <a:rPr lang="de-DE"/>
+              <a:rPr lang="de-DE" dirty="0"/>
+              <a:t>Milestones</a:t>
+            </a:r>
+          </a:p>
+          <a:p>
+            <a:pPr lvl="0"/>
+            <a:r>
+              <a:rPr lang="de-DE" dirty="0"/>
               <a:t>Additional </a:t>
             </a:r>
             <a:r>
-              <a:rPr lang="de-DE" err="1"/>
+              <a:rPr lang="de-DE" dirty="0" err="1"/>
               <a:t>characterstic</a:t>
             </a:r>
             <a:r>
-              <a:rPr lang="de-DE"/>
+              <a:rPr lang="de-DE" dirty="0"/>
               <a:t> </a:t>
             </a:r>
             <a:r>
-              <a:rPr lang="de-DE" err="1"/>
+              <a:rPr lang="de-DE" dirty="0" err="1"/>
               <a:t>parameters</a:t>
             </a:r>
-            <a:endParaRPr lang="de-DE"/>
+            <a:endParaRPr lang="de-DE" dirty="0"/>
           </a:p>
           <a:p>
             <a:pPr lvl="0"/>
             <a:r>
-              <a:rPr lang="de-DE" err="1"/>
+              <a:rPr lang="de-DE" dirty="0" err="1"/>
               <a:t>Detailed</a:t>
             </a:r>
             <a:r>
-              <a:rPr lang="de-DE"/>
+              <a:rPr lang="de-DE" dirty="0"/>
               <a:t> </a:t>
             </a:r>
             <a:r>
-              <a:rPr lang="de-DE" err="1"/>
+              <a:rPr lang="de-DE" dirty="0" err="1"/>
               <a:t>guidelines</a:t>
             </a:r>
-            <a:endParaRPr lang="de-DE"/>
+            <a:endParaRPr lang="de-DE" dirty="0"/>
           </a:p>
           <a:p>
             <a:pPr lvl="1"/>
-            <a:endParaRPr lang="de-DE"/>
+            <a:endParaRPr lang="de-DE" dirty="0"/>
           </a:p>
         </p:txBody>
       </p:sp>
@@ -24637,6 +24646,172 @@
 </file>
 
 <file path=ppt/slides/slide4.xml><?xml version="1.0" encoding="utf-8"?>
+<p:sld xmlns:a="http://schemas.openxmlformats.org/drawingml/2006/main" xmlns:r="http://schemas.openxmlformats.org/officeDocument/2006/relationships" xmlns:p="http://schemas.openxmlformats.org/presentationml/2006/main">
+  <p:cSld>
+    <p:spTree>
+      <p:nvGrpSpPr>
+        <p:cNvPr id="1" name=""/>
+        <p:cNvGrpSpPr/>
+        <p:nvPr/>
+      </p:nvGrpSpPr>
+      <p:grpSpPr>
+        <a:xfrm>
+          <a:off x="0" y="0"/>
+          <a:ext cx="0" cy="0"/>
+          <a:chOff x="0" y="0"/>
+          <a:chExt cx="0" cy="0"/>
+        </a:xfrm>
+      </p:grpSpPr>
+      <p:sp>
+        <p:nvSpPr>
+          <p:cNvPr id="3" name="Titel 2">
+            <a:extLst>
+              <a:ext uri="{FF2B5EF4-FFF2-40B4-BE49-F238E27FC236}">
+                <a16:creationId xmlns:a16="http://schemas.microsoft.com/office/drawing/2014/main" id="{F3F20E47-6491-6E69-B36E-A338E0DA0A16}"/>
+              </a:ext>
+            </a:extLst>
+          </p:cNvPr>
+          <p:cNvSpPr>
+            <a:spLocks noGrp="1"/>
+          </p:cNvSpPr>
+          <p:nvPr>
+            <p:ph type="title"/>
+          </p:nvPr>
+        </p:nvSpPr>
+        <p:spPr/>
+        <p:txBody>
+          <a:bodyPr/>
+          <a:lstStyle/>
+          <a:p>
+            <a:r>
+              <a:rPr lang="en-GB" dirty="0"/>
+              <a:t>1. Milestones</a:t>
+            </a:r>
+          </a:p>
+        </p:txBody>
+      </p:sp>
+      <p:sp>
+        <p:nvSpPr>
+          <p:cNvPr id="4" name="Datumsplatzhalter 3">
+            <a:extLst>
+              <a:ext uri="{FF2B5EF4-FFF2-40B4-BE49-F238E27FC236}">
+                <a16:creationId xmlns:a16="http://schemas.microsoft.com/office/drawing/2014/main" id="{2468A725-1151-DBAE-F61A-938E6B88F5C6}"/>
+              </a:ext>
+            </a:extLst>
+          </p:cNvPr>
+          <p:cNvSpPr>
+            <a:spLocks noGrp="1"/>
+          </p:cNvSpPr>
+          <p:nvPr>
+            <p:ph type="dt" sz="half" idx="10"/>
+          </p:nvPr>
+        </p:nvSpPr>
+        <p:spPr/>
+        <p:txBody>
+          <a:bodyPr/>
+          <a:lstStyle/>
+          <a:p>
+            <a:fld id="{02AEE8E4-D792-40D2-B8D4-0007E21A0CF8}" type="datetime1">
+              <a:rPr lang="en-GB" smtClean="0"/>
+              <a:t>27/10/2025</a:t>
+            </a:fld>
+            <a:endParaRPr lang="en-GB"/>
+          </a:p>
+        </p:txBody>
+      </p:sp>
+      <p:sp>
+        <p:nvSpPr>
+          <p:cNvPr id="5" name="Foliennummernplatzhalter 4">
+            <a:extLst>
+              <a:ext uri="{FF2B5EF4-FFF2-40B4-BE49-F238E27FC236}">
+                <a16:creationId xmlns:a16="http://schemas.microsoft.com/office/drawing/2014/main" id="{0DAD5108-D72E-BFB4-AADA-AEA8645AA52C}"/>
+              </a:ext>
+            </a:extLst>
+          </p:cNvPr>
+          <p:cNvSpPr>
+            <a:spLocks noGrp="1"/>
+          </p:cNvSpPr>
+          <p:nvPr>
+            <p:ph type="sldNum" sz="quarter" idx="12"/>
+          </p:nvPr>
+        </p:nvSpPr>
+        <p:spPr/>
+        <p:txBody>
+          <a:bodyPr/>
+          <a:lstStyle/>
+          <a:p>
+            <a:fld id="{013F6232-4F06-48BA-8F69-BF531F607829}" type="slidenum">
+              <a:rPr lang="en-GB" smtClean="0"/>
+              <a:pPr/>
+              <a:t>4</a:t>
+            </a:fld>
+            <a:endParaRPr lang="en-GB"/>
+          </a:p>
+        </p:txBody>
+      </p:sp>
+      <p:pic>
+        <p:nvPicPr>
+          <p:cNvPr id="1026" name="Picture 2">
+            <a:extLst>
+              <a:ext uri="{FF2B5EF4-FFF2-40B4-BE49-F238E27FC236}">
+                <a16:creationId xmlns:a16="http://schemas.microsoft.com/office/drawing/2014/main" id="{1397FBE8-D4DC-F294-D7E2-624FD36D25F5}"/>
+              </a:ext>
+            </a:extLst>
+          </p:cNvPr>
+          <p:cNvPicPr>
+            <a:picLocks noGrp="1" noChangeAspect="1" noChangeArrowheads="1"/>
+          </p:cNvPicPr>
+          <p:nvPr>
+            <p:ph idx="1"/>
+          </p:nvPr>
+        </p:nvPicPr>
+        <p:blipFill>
+          <a:blip r:embed="rId2">
+            <a:extLst>
+              <a:ext uri="{28A0092B-C50C-407E-A947-70E740481C1C}">
+                <a14:useLocalDpi xmlns:a14="http://schemas.microsoft.com/office/drawing/2010/main" val="0"/>
+              </a:ext>
+            </a:extLst>
+          </a:blip>
+          <a:srcRect/>
+          <a:stretch>
+            <a:fillRect/>
+          </a:stretch>
+        </p:blipFill>
+        <p:spPr bwMode="auto">
+          <a:xfrm>
+            <a:off x="838200" y="2460466"/>
+            <a:ext cx="10515600" cy="3081655"/>
+          </a:xfrm>
+          <a:prstGeom prst="rect">
+            <a:avLst/>
+          </a:prstGeom>
+          <a:noFill/>
+          <a:extLst>
+            <a:ext uri="{909E8E84-426E-40DD-AFC4-6F175D3DCCD1}">
+              <a14:hiddenFill xmlns:a14="http://schemas.microsoft.com/office/drawing/2010/main">
+                <a:solidFill>
+                  <a:srgbClr val="FFFFFF"/>
+                </a:solidFill>
+              </a14:hiddenFill>
+            </a:ext>
+          </a:extLst>
+        </p:spPr>
+      </p:pic>
+    </p:spTree>
+    <p:extLst>
+      <p:ext uri="{BB962C8B-B14F-4D97-AF65-F5344CB8AC3E}">
+        <p14:creationId xmlns:p14="http://schemas.microsoft.com/office/powerpoint/2010/main" val="268384413"/>
+      </p:ext>
+    </p:extLst>
+  </p:cSld>
+  <p:clrMapOvr>
+    <a:masterClrMapping/>
+  </p:clrMapOvr>
+</p:sld>
+</file>
+
+<file path=ppt/slides/slide5.xml><?xml version="1.0" encoding="utf-8"?>
 <p:sld xmlns:a="http://schemas.openxmlformats.org/drawingml/2006/main" xmlns:r="http://schemas.openxmlformats.org/officeDocument/2006/relationships" xmlns:p="http://schemas.openxmlformats.org/presentationml/2006/main">
   <p:cSld>
     <p:spTree>
@@ -24681,26 +24856,26 @@
           <a:lstStyle/>
           <a:p>
             <a:r>
-              <a:rPr lang="de-DE"/>
-              <a:t>1. Additional </a:t>
-            </a:r>
-            <a:r>
-              <a:rPr lang="de-DE" err="1"/>
+              <a:rPr lang="de-DE" dirty="0"/>
+              <a:t>2. Additional </a:t>
+            </a:r>
+            <a:r>
+              <a:rPr lang="de-DE" dirty="0" err="1"/>
               <a:t>characterstic</a:t>
             </a:r>
             <a:r>
-              <a:rPr lang="de-DE"/>
+              <a:rPr lang="de-DE" dirty="0"/>
               <a:t> </a:t>
             </a:r>
             <a:r>
-              <a:rPr lang="de-DE" err="1"/>
+              <a:rPr lang="de-DE" dirty="0" err="1"/>
               <a:t>parameters</a:t>
             </a:r>
             <a:r>
-              <a:rPr lang="de-DE"/>
+              <a:rPr lang="de-DE" dirty="0"/>
               <a:t>  </a:t>
             </a:r>
-            <a:endParaRPr lang="en-GB"/>
+            <a:endParaRPr lang="en-GB" dirty="0"/>
           </a:p>
         </p:txBody>
       </p:sp>
@@ -24756,7 +24931,7 @@
           <a:p>
             <a:fld id="{013F6232-4F06-48BA-8F69-BF531F607829}" type="slidenum">
               <a:rPr lang="en-GB" smtClean="0"/>
-              <a:t>4</a:t>
+              <a:t>5</a:t>
             </a:fld>
             <a:endParaRPr lang="en-GB"/>
           </a:p>
@@ -25598,7 +25773,7 @@
 </p:sld>
 </file>
 
-<file path=ppt/slides/slide5.xml><?xml version="1.0" encoding="utf-8"?>
+<file path=ppt/slides/slide6.xml><?xml version="1.0" encoding="utf-8"?>
 <p:sld xmlns:a="http://schemas.openxmlformats.org/drawingml/2006/main" xmlns:r="http://schemas.openxmlformats.org/officeDocument/2006/relationships" xmlns:p="http://schemas.openxmlformats.org/presentationml/2006/main">
   <p:cSld>
     <p:spTree>
@@ -25643,26 +25818,26 @@
           <a:lstStyle/>
           <a:p>
             <a:r>
-              <a:rPr lang="de-DE"/>
-              <a:t>1. Additional </a:t>
-            </a:r>
-            <a:r>
-              <a:rPr lang="de-DE" err="1"/>
+              <a:rPr lang="de-DE" dirty="0"/>
+              <a:t>2. Additional </a:t>
+            </a:r>
+            <a:r>
+              <a:rPr lang="de-DE" dirty="0" err="1"/>
               <a:t>characterstic</a:t>
             </a:r>
             <a:r>
-              <a:rPr lang="de-DE"/>
+              <a:rPr lang="de-DE" dirty="0"/>
               <a:t> </a:t>
             </a:r>
             <a:r>
-              <a:rPr lang="de-DE" err="1"/>
+              <a:rPr lang="de-DE" dirty="0" err="1"/>
               <a:t>parameters</a:t>
             </a:r>
             <a:r>
-              <a:rPr lang="de-DE"/>
+              <a:rPr lang="de-DE" dirty="0"/>
               <a:t>  </a:t>
             </a:r>
-            <a:endParaRPr lang="en-GB"/>
+            <a:endParaRPr lang="en-GB" dirty="0"/>
           </a:p>
         </p:txBody>
       </p:sp>
@@ -25718,7 +25893,7 @@
           <a:p>
             <a:fld id="{013F6232-4F06-48BA-8F69-BF531F607829}" type="slidenum">
               <a:rPr lang="en-GB" smtClean="0"/>
-              <a:t>5</a:t>
+              <a:t>6</a:t>
             </a:fld>
             <a:endParaRPr lang="en-GB"/>
           </a:p>
@@ -26502,7 +26677,7 @@
 </p:sld>
 </file>
 
-<file path=ppt/slides/slide6.xml><?xml version="1.0" encoding="utf-8"?>
+<file path=ppt/slides/slide7.xml><?xml version="1.0" encoding="utf-8"?>
 <p:sld xmlns:a="http://schemas.openxmlformats.org/drawingml/2006/main" xmlns:r="http://schemas.openxmlformats.org/officeDocument/2006/relationships" xmlns:p="http://schemas.openxmlformats.org/presentationml/2006/main">
   <p:cSld>
     <p:spTree>
@@ -26548,22 +26723,22 @@
           <a:p>
             <a:pPr lvl="0"/>
             <a:r>
-              <a:rPr lang="de-DE"/>
-              <a:t>2. </a:t>
-            </a:r>
-            <a:r>
-              <a:rPr lang="de-DE" err="1"/>
+              <a:rPr lang="de-DE" dirty="0"/>
+              <a:t>3. </a:t>
+            </a:r>
+            <a:r>
+              <a:rPr lang="de-DE" dirty="0" err="1"/>
               <a:t>Necessary</a:t>
             </a:r>
             <a:r>
-              <a:rPr lang="de-DE"/>
+              <a:rPr lang="de-DE" dirty="0"/>
               <a:t> </a:t>
             </a:r>
             <a:r>
-              <a:rPr lang="de-DE" err="1"/>
+              <a:rPr lang="de-DE" dirty="0" err="1"/>
               <a:t>guidelines</a:t>
             </a:r>
-            <a:endParaRPr lang="de-DE"/>
+            <a:endParaRPr lang="de-DE" dirty="0"/>
           </a:p>
         </p:txBody>
       </p:sp>
@@ -26619,7 +26794,7 @@
           <a:p>
             <a:fld id="{013F6232-4F06-48BA-8F69-BF531F607829}" type="slidenum">
               <a:rPr lang="en-GB" smtClean="0"/>
-              <a:t>6</a:t>
+              <a:t>7</a:t>
             </a:fld>
             <a:endParaRPr lang="en-GB"/>
           </a:p>
@@ -26959,7 +27134,7 @@
 </p:sld>
 </file>
 
-<file path=ppt/slides/slide7.xml><?xml version="1.0" encoding="utf-8"?>
+<file path=ppt/slides/slide8.xml><?xml version="1.0" encoding="utf-8"?>
 <p:sld xmlns:a="http://schemas.openxmlformats.org/drawingml/2006/main" xmlns:r="http://schemas.openxmlformats.org/officeDocument/2006/relationships" xmlns:p="http://schemas.openxmlformats.org/presentationml/2006/main">
   <p:cSld>
     <p:spTree>
@@ -27005,22 +27180,22 @@
           <a:p>
             <a:pPr lvl="0"/>
             <a:r>
-              <a:rPr lang="de-DE"/>
-              <a:t>2. </a:t>
-            </a:r>
-            <a:r>
-              <a:rPr lang="de-DE" err="1"/>
+              <a:rPr lang="de-DE" dirty="0"/>
+              <a:t>3. </a:t>
+            </a:r>
+            <a:r>
+              <a:rPr lang="de-DE" dirty="0" err="1"/>
               <a:t>Necessary</a:t>
             </a:r>
             <a:r>
-              <a:rPr lang="de-DE"/>
+              <a:rPr lang="de-DE" dirty="0"/>
               <a:t> </a:t>
             </a:r>
             <a:r>
-              <a:rPr lang="de-DE" err="1"/>
+              <a:rPr lang="de-DE" dirty="0" err="1"/>
               <a:t>guidelines</a:t>
             </a:r>
-            <a:endParaRPr lang="de-DE"/>
+            <a:endParaRPr lang="de-DE" dirty="0"/>
           </a:p>
         </p:txBody>
       </p:sp>
@@ -27076,7 +27251,7 @@
           <a:p>
             <a:fld id="{013F6232-4F06-48BA-8F69-BF531F607829}" type="slidenum">
               <a:rPr lang="en-GB" smtClean="0"/>
-              <a:t>7</a:t>
+              <a:t>8</a:t>
             </a:fld>
             <a:endParaRPr lang="en-GB"/>
           </a:p>
@@ -27379,7 +27554,7 @@
 </p:sld>
 </file>
 
-<file path=ppt/slides/slide8.xml><?xml version="1.0" encoding="utf-8"?>
+<file path=ppt/slides/slide9.xml><?xml version="1.0" encoding="utf-8"?>
 <p:sld xmlns:a="http://schemas.openxmlformats.org/drawingml/2006/main" xmlns:r="http://schemas.openxmlformats.org/officeDocument/2006/relationships" xmlns:p="http://schemas.openxmlformats.org/presentationml/2006/main">
   <p:cSld>
     <p:spTree>
@@ -27642,7 +27817,7 @@
             <a:fld id="{013F6232-4F06-48BA-8F69-BF531F607829}" type="slidenum">
               <a:rPr lang="en-GB" smtClean="0"/>
               <a:pPr/>
-              <a:t>8</a:t>
+              <a:t>9</a:t>
             </a:fld>
             <a:endParaRPr lang="en-GB"/>
           </a:p>

</xml_diff>